<commit_message>
some modifications on the ppt
</commit_message>
<xml_diff>
--- a/Plots/Presentation_Stauffenegger_Woessner.pptx
+++ b/Plots/Presentation_Stauffenegger_Woessner.pptx
@@ -177,7 +177,7 @@
 <file path=ppt/charts/chart1.xml><?xml version="1.0" encoding="utf-8"?>
 <c:chartSpace xmlns:c="http://schemas.openxmlformats.org/drawingml/2006/chart" xmlns:a="http://schemas.openxmlformats.org/drawingml/2006/main" xmlns:r="http://schemas.openxmlformats.org/officeDocument/2006/relationships" xmlns:c16r2="http://schemas.microsoft.com/office/drawing/2015/06/chart">
   <c:date1904 val="0"/>
-  <c:lang val="en-US"/>
+  <c:lang val="de-DE"/>
   <c:roundedCorners val="0"/>
   <mc:AlternateContent xmlns:mc="http://schemas.openxmlformats.org/markup-compatibility/2006">
     <mc:Choice xmlns:c14="http://schemas.microsoft.com/office/drawing/2007/8/2/chart" Requires="c14">
@@ -7568,7 +7568,7 @@
 <file path=ppt/charts/chart2.xml><?xml version="1.0" encoding="utf-8"?>
 <c:chartSpace xmlns:c="http://schemas.openxmlformats.org/drawingml/2006/chart" xmlns:a="http://schemas.openxmlformats.org/drawingml/2006/main" xmlns:r="http://schemas.openxmlformats.org/officeDocument/2006/relationships" xmlns:c16r2="http://schemas.microsoft.com/office/drawing/2015/06/chart">
   <c:date1904 val="0"/>
-  <c:lang val="en-US"/>
+  <c:lang val="de-DE"/>
   <c:roundedCorners val="0"/>
   <mc:AlternateContent xmlns:mc="http://schemas.openxmlformats.org/markup-compatibility/2006">
     <mc:Choice xmlns:c14="http://schemas.microsoft.com/office/drawing/2007/8/2/chart" Requires="c14">
@@ -12554,7 +12554,7 @@
           <a:p>
             <a:fld id="{176B0303-6F4F-5243-998E-2D2CC346AF00}" type="datetimeFigureOut">
               <a:rPr lang="en-US" smtClean="0"/>
-              <a:t>4/29/19</a:t>
+              <a:t>5/1/2019</a:t>
             </a:fld>
             <a:endParaRPr lang="en-US"/>
           </a:p>
@@ -12712,7 +12712,7 @@
           <a:p>
             <a:fld id="{FFAEC33B-D15A-F948-9B21-8F6BC0A9396E}" type="slidenum">
               <a:rPr lang="en-US" smtClean="0"/>
-              <a:t>‹#›</a:t>
+              <a:t>‹Nr.›</a:t>
             </a:fld>
             <a:endParaRPr lang="en-US"/>
           </a:p>
@@ -12821,6 +12821,566 @@
 </p:notesMaster>
 </file>
 
+<file path=ppt/notesSlides/notesSlide1.xml><?xml version="1.0" encoding="utf-8"?>
+<p:notes xmlns:a="http://schemas.openxmlformats.org/drawingml/2006/main" xmlns:r="http://schemas.openxmlformats.org/officeDocument/2006/relationships" xmlns:p="http://schemas.openxmlformats.org/presentationml/2006/main">
+  <p:cSld>
+    <p:spTree>
+      <p:nvGrpSpPr>
+        <p:cNvPr id="1" name=""/>
+        <p:cNvGrpSpPr/>
+        <p:nvPr/>
+      </p:nvGrpSpPr>
+      <p:grpSpPr>
+        <a:xfrm>
+          <a:off x="0" y="0"/>
+          <a:ext cx="0" cy="0"/>
+          <a:chOff x="0" y="0"/>
+          <a:chExt cx="0" cy="0"/>
+        </a:xfrm>
+      </p:grpSpPr>
+      <p:sp>
+        <p:nvSpPr>
+          <p:cNvPr id="2" name="Folienbildplatzhalter 1"/>
+          <p:cNvSpPr>
+            <a:spLocks noGrp="1" noRot="1" noChangeAspect="1"/>
+          </p:cNvSpPr>
+          <p:nvPr>
+            <p:ph type="sldImg"/>
+          </p:nvPr>
+        </p:nvSpPr>
+        <p:spPr/>
+      </p:sp>
+      <p:sp>
+        <p:nvSpPr>
+          <p:cNvPr id="3" name="Notizenplatzhalter 2"/>
+          <p:cNvSpPr>
+            <a:spLocks noGrp="1"/>
+          </p:cNvSpPr>
+          <p:nvPr>
+            <p:ph type="body" idx="1"/>
+          </p:nvPr>
+        </p:nvSpPr>
+        <p:spPr/>
+        <p:txBody>
+          <a:bodyPr/>
+          <a:lstStyle/>
+          <a:p>
+            <a:r>
+              <a:rPr lang="en-US" dirty="0">
+                <a:latin typeface="Garamond" panose="02020404030301010803" pitchFamily="18" charset="0"/>
+              </a:rPr>
+              <a:t>QE has become increasingly popular as a policy tool in zero interest environments</a:t>
+            </a:r>
+          </a:p>
+          <a:p>
+            <a:endParaRPr lang="en-US" dirty="0">
+              <a:latin typeface="Garamond" panose="02020404030301010803" pitchFamily="18" charset="0"/>
+            </a:endParaRPr>
+          </a:p>
+          <a:p>
+            <a:pPr marL="0" marR="0" lvl="0" indent="0" algn="l" defTabSz="914400" rtl="0" eaLnBrk="1" fontAlgn="auto" latinLnBrk="0" hangingPunct="1">
+              <a:lnSpc>
+                <a:spcPct val="100000"/>
+              </a:lnSpc>
+              <a:spcBef>
+                <a:spcPts val="0"/>
+              </a:spcBef>
+              <a:spcAft>
+                <a:spcPts val="0"/>
+              </a:spcAft>
+              <a:buClrTx/>
+              <a:buSzTx/>
+              <a:buFontTx/>
+              <a:buNone/>
+              <a:tabLst/>
+              <a:defRPr/>
+            </a:pPr>
+            <a:r>
+              <a:rPr lang="en-US" sz="1200" dirty="0">
+                <a:latin typeface="Garamond" panose="02020404030301010803" pitchFamily="18" charset="0"/>
+              </a:rPr>
+              <a:t>European financial crisis led to strong appreciation of the CHF compared to EURO.</a:t>
+            </a:r>
+          </a:p>
+          <a:p>
+            <a:endParaRPr lang="de-CH" dirty="0"/>
+          </a:p>
+        </p:txBody>
+      </p:sp>
+      <p:sp>
+        <p:nvSpPr>
+          <p:cNvPr id="4" name="Foliennummernplatzhalter 3"/>
+          <p:cNvSpPr>
+            <a:spLocks noGrp="1"/>
+          </p:cNvSpPr>
+          <p:nvPr>
+            <p:ph type="sldNum" sz="quarter" idx="5"/>
+          </p:nvPr>
+        </p:nvSpPr>
+        <p:spPr/>
+        <p:txBody>
+          <a:bodyPr/>
+          <a:lstStyle/>
+          <a:p>
+            <a:fld id="{FFAEC33B-D15A-F948-9B21-8F6BC0A9396E}" type="slidenum">
+              <a:rPr lang="en-US" smtClean="0"/>
+              <a:t>3</a:t>
+            </a:fld>
+            <a:endParaRPr lang="en-US"/>
+          </a:p>
+        </p:txBody>
+      </p:sp>
+    </p:spTree>
+    <p:extLst>
+      <p:ext uri="{BB962C8B-B14F-4D97-AF65-F5344CB8AC3E}">
+        <p14:creationId xmlns:p14="http://schemas.microsoft.com/office/powerpoint/2010/main" val="2944391626"/>
+      </p:ext>
+    </p:extLst>
+  </p:cSld>
+  <p:clrMapOvr>
+    <a:masterClrMapping/>
+  </p:clrMapOvr>
+</p:notes>
+</file>
+
+<file path=ppt/notesSlides/notesSlide2.xml><?xml version="1.0" encoding="utf-8"?>
+<p:notes xmlns:a="http://schemas.openxmlformats.org/drawingml/2006/main" xmlns:r="http://schemas.openxmlformats.org/officeDocument/2006/relationships" xmlns:p="http://schemas.openxmlformats.org/presentationml/2006/main">
+  <p:cSld>
+    <p:spTree>
+      <p:nvGrpSpPr>
+        <p:cNvPr id="1" name=""/>
+        <p:cNvGrpSpPr/>
+        <p:nvPr/>
+      </p:nvGrpSpPr>
+      <p:grpSpPr>
+        <a:xfrm>
+          <a:off x="0" y="0"/>
+          <a:ext cx="0" cy="0"/>
+          <a:chOff x="0" y="0"/>
+          <a:chExt cx="0" cy="0"/>
+        </a:xfrm>
+      </p:grpSpPr>
+      <p:sp>
+        <p:nvSpPr>
+          <p:cNvPr id="2" name="Folienbildplatzhalter 1"/>
+          <p:cNvSpPr>
+            <a:spLocks noGrp="1" noRot="1" noChangeAspect="1"/>
+          </p:cNvSpPr>
+          <p:nvPr>
+            <p:ph type="sldImg"/>
+          </p:nvPr>
+        </p:nvSpPr>
+        <p:spPr/>
+      </p:sp>
+      <p:sp>
+        <p:nvSpPr>
+          <p:cNvPr id="3" name="Notizenplatzhalter 2"/>
+          <p:cNvSpPr>
+            <a:spLocks noGrp="1"/>
+          </p:cNvSpPr>
+          <p:nvPr>
+            <p:ph type="body" idx="1"/>
+          </p:nvPr>
+        </p:nvSpPr>
+        <p:spPr/>
+        <p:txBody>
+          <a:bodyPr/>
+          <a:lstStyle/>
+          <a:p>
+            <a:pPr marL="0" marR="0" lvl="0" indent="0" algn="l" defTabSz="914400" rtl="0" eaLnBrk="1" fontAlgn="auto" latinLnBrk="0" hangingPunct="1">
+              <a:lnSpc>
+                <a:spcPct val="100000"/>
+              </a:lnSpc>
+              <a:spcBef>
+                <a:spcPts val="0"/>
+              </a:spcBef>
+              <a:spcAft>
+                <a:spcPts val="0"/>
+              </a:spcAft>
+              <a:buClrTx/>
+              <a:buSzTx/>
+              <a:buFontTx/>
+              <a:buNone/>
+              <a:tabLst/>
+              <a:defRPr/>
+            </a:pPr>
+            <a:r>
+              <a:rPr lang="en-US" dirty="0">
+                <a:latin typeface="Garamond" panose="02020404030301010803" pitchFamily="18" charset="0"/>
+              </a:rPr>
+              <a:t>Unconventional MP and spill over to other asset classes</a:t>
+            </a:r>
+            <a:endParaRPr lang="en-US" sz="1200" dirty="0">
+              <a:latin typeface="Garamond" panose="02020404030301010803" pitchFamily="18" charset="0"/>
+            </a:endParaRPr>
+          </a:p>
+          <a:p>
+            <a:pPr marL="0" marR="0" lvl="0" indent="0" algn="l" defTabSz="914400" rtl="0" eaLnBrk="1" fontAlgn="auto" latinLnBrk="0" hangingPunct="1">
+              <a:lnSpc>
+                <a:spcPct val="100000"/>
+              </a:lnSpc>
+              <a:spcBef>
+                <a:spcPts val="0"/>
+              </a:spcBef>
+              <a:spcAft>
+                <a:spcPts val="0"/>
+              </a:spcAft>
+              <a:buClrTx/>
+              <a:buSzTx/>
+              <a:buFontTx/>
+              <a:buNone/>
+              <a:tabLst/>
+              <a:defRPr/>
+            </a:pPr>
+            <a:r>
+              <a:rPr lang="en-US" sz="1200" dirty="0">
+                <a:latin typeface="Garamond" panose="02020404030301010803" pitchFamily="18" charset="0"/>
+              </a:rPr>
+              <a:t>New liquidity rests as sight deposits on the central banks balance sheet and is allocated to domestic banks.</a:t>
+            </a:r>
+          </a:p>
+          <a:p>
+            <a:endParaRPr lang="de-CH" dirty="0"/>
+          </a:p>
+        </p:txBody>
+      </p:sp>
+      <p:sp>
+        <p:nvSpPr>
+          <p:cNvPr id="4" name="Foliennummernplatzhalter 3"/>
+          <p:cNvSpPr>
+            <a:spLocks noGrp="1"/>
+          </p:cNvSpPr>
+          <p:nvPr>
+            <p:ph type="sldNum" sz="quarter" idx="5"/>
+          </p:nvPr>
+        </p:nvSpPr>
+        <p:spPr/>
+        <p:txBody>
+          <a:bodyPr/>
+          <a:lstStyle/>
+          <a:p>
+            <a:fld id="{FFAEC33B-D15A-F948-9B21-8F6BC0A9396E}" type="slidenum">
+              <a:rPr lang="en-US" smtClean="0"/>
+              <a:t>6</a:t>
+            </a:fld>
+            <a:endParaRPr lang="en-US"/>
+          </a:p>
+        </p:txBody>
+      </p:sp>
+    </p:spTree>
+    <p:extLst>
+      <p:ext uri="{BB962C8B-B14F-4D97-AF65-F5344CB8AC3E}">
+        <p14:creationId xmlns:p14="http://schemas.microsoft.com/office/powerpoint/2010/main" val="3343195843"/>
+      </p:ext>
+    </p:extLst>
+  </p:cSld>
+  <p:clrMapOvr>
+    <a:masterClrMapping/>
+  </p:clrMapOvr>
+</p:notes>
+</file>
+
+<file path=ppt/notesSlides/notesSlide3.xml><?xml version="1.0" encoding="utf-8"?>
+<p:notes xmlns:a="http://schemas.openxmlformats.org/drawingml/2006/main" xmlns:r="http://schemas.openxmlformats.org/officeDocument/2006/relationships" xmlns:p="http://schemas.openxmlformats.org/presentationml/2006/main">
+  <p:cSld>
+    <p:spTree>
+      <p:nvGrpSpPr>
+        <p:cNvPr id="1" name=""/>
+        <p:cNvGrpSpPr/>
+        <p:nvPr/>
+      </p:nvGrpSpPr>
+      <p:grpSpPr>
+        <a:xfrm>
+          <a:off x="0" y="0"/>
+          <a:ext cx="0" cy="0"/>
+          <a:chOff x="0" y="0"/>
+          <a:chExt cx="0" cy="0"/>
+        </a:xfrm>
+      </p:grpSpPr>
+      <p:sp>
+        <p:nvSpPr>
+          <p:cNvPr id="2" name="Folienbildplatzhalter 1"/>
+          <p:cNvSpPr>
+            <a:spLocks noGrp="1" noRot="1" noChangeAspect="1"/>
+          </p:cNvSpPr>
+          <p:nvPr>
+            <p:ph type="sldImg"/>
+          </p:nvPr>
+        </p:nvSpPr>
+        <p:spPr/>
+      </p:sp>
+      <p:sp>
+        <p:nvSpPr>
+          <p:cNvPr id="3" name="Notizenplatzhalter 2"/>
+          <p:cNvSpPr>
+            <a:spLocks noGrp="1"/>
+          </p:cNvSpPr>
+          <p:nvPr>
+            <p:ph type="body" idx="1"/>
+          </p:nvPr>
+        </p:nvSpPr>
+        <p:spPr/>
+        <p:txBody>
+          <a:bodyPr/>
+          <a:lstStyle/>
+          <a:p>
+            <a:r>
+              <a:rPr lang="de-CH" dirty="0"/>
+              <a:t>Do </a:t>
+            </a:r>
+            <a:r>
+              <a:rPr lang="de-CH" dirty="0" err="1"/>
+              <a:t>we</a:t>
+            </a:r>
+            <a:r>
+              <a:rPr lang="de-CH" dirty="0"/>
+              <a:t> find </a:t>
+            </a:r>
+            <a:r>
+              <a:rPr lang="de-CH" dirty="0" err="1"/>
+              <a:t>Spillover</a:t>
+            </a:r>
+            <a:r>
+              <a:rPr lang="de-CH" dirty="0"/>
+              <a:t> </a:t>
+            </a:r>
+            <a:r>
+              <a:rPr lang="de-CH" dirty="0" err="1"/>
+              <a:t>effects</a:t>
+            </a:r>
+            <a:r>
+              <a:rPr lang="de-CH" dirty="0"/>
+              <a:t> </a:t>
+            </a:r>
+            <a:r>
+              <a:rPr lang="de-CH" dirty="0" err="1"/>
+              <a:t>of</a:t>
+            </a:r>
+            <a:r>
+              <a:rPr lang="de-CH" dirty="0"/>
+              <a:t> SNB </a:t>
+            </a:r>
+            <a:r>
+              <a:rPr lang="de-CH" dirty="0" err="1"/>
+              <a:t>interventions</a:t>
+            </a:r>
+            <a:r>
+              <a:rPr lang="de-CH" dirty="0"/>
+              <a:t> </a:t>
+            </a:r>
+            <a:r>
+              <a:rPr lang="de-CH" dirty="0" err="1"/>
+              <a:t>to</a:t>
+            </a:r>
+            <a:r>
+              <a:rPr lang="de-CH" dirty="0"/>
+              <a:t> </a:t>
+            </a:r>
+            <a:r>
+              <a:rPr lang="de-CH" dirty="0" err="1"/>
+              <a:t>the</a:t>
+            </a:r>
+            <a:r>
+              <a:rPr lang="de-CH" dirty="0"/>
+              <a:t> Swiss Stock Market </a:t>
+            </a:r>
+            <a:r>
+              <a:rPr lang="de-CH" dirty="0" err="1"/>
+              <a:t>through</a:t>
+            </a:r>
+            <a:r>
+              <a:rPr lang="de-CH" dirty="0"/>
+              <a:t> </a:t>
+            </a:r>
+            <a:r>
+              <a:rPr lang="de-CH" dirty="0" err="1"/>
+              <a:t>the</a:t>
+            </a:r>
+            <a:r>
+              <a:rPr lang="de-CH" dirty="0"/>
+              <a:t> </a:t>
+            </a:r>
+            <a:r>
+              <a:rPr lang="de-CH" dirty="0" err="1"/>
+              <a:t>Signalling</a:t>
+            </a:r>
+            <a:r>
+              <a:rPr lang="de-CH" dirty="0"/>
+              <a:t> Channel?</a:t>
+            </a:r>
+          </a:p>
+          <a:p>
+            <a:r>
+              <a:rPr lang="de-CH" dirty="0" err="1"/>
+              <a:t>Is</a:t>
+            </a:r>
+            <a:r>
+              <a:rPr lang="de-CH" dirty="0"/>
+              <a:t> </a:t>
+            </a:r>
+            <a:r>
+              <a:rPr lang="de-CH" dirty="0" err="1"/>
+              <a:t>confirmed</a:t>
+            </a:r>
+            <a:r>
+              <a:rPr lang="de-CH" dirty="0"/>
+              <a:t>, </a:t>
+            </a:r>
+            <a:r>
+              <a:rPr lang="de-CH" dirty="0" err="1"/>
+              <a:t>if</a:t>
+            </a:r>
+            <a:r>
+              <a:rPr lang="de-CH" dirty="0"/>
+              <a:t> </a:t>
+            </a:r>
+            <a:r>
+              <a:rPr lang="de-CH" dirty="0" err="1"/>
+              <a:t>the</a:t>
+            </a:r>
+            <a:r>
+              <a:rPr lang="de-CH" dirty="0"/>
+              <a:t> </a:t>
+            </a:r>
+            <a:r>
+              <a:rPr lang="de-CH" dirty="0" err="1"/>
+              <a:t>classification</a:t>
+            </a:r>
+            <a:r>
+              <a:rPr lang="de-CH" dirty="0"/>
+              <a:t> </a:t>
+            </a:r>
+            <a:r>
+              <a:rPr lang="de-CH" dirty="0" err="1"/>
+              <a:t>Algorithm</a:t>
+            </a:r>
+            <a:r>
+              <a:rPr lang="de-CH" dirty="0"/>
+              <a:t> </a:t>
+            </a:r>
+          </a:p>
+        </p:txBody>
+      </p:sp>
+      <p:sp>
+        <p:nvSpPr>
+          <p:cNvPr id="4" name="Foliennummernplatzhalter 3"/>
+          <p:cNvSpPr>
+            <a:spLocks noGrp="1"/>
+          </p:cNvSpPr>
+          <p:nvPr>
+            <p:ph type="sldNum" sz="quarter" idx="5"/>
+          </p:nvPr>
+        </p:nvSpPr>
+        <p:spPr/>
+        <p:txBody>
+          <a:bodyPr/>
+          <a:lstStyle/>
+          <a:p>
+            <a:fld id="{FFAEC33B-D15A-F948-9B21-8F6BC0A9396E}" type="slidenum">
+              <a:rPr lang="en-US" smtClean="0"/>
+              <a:t>7</a:t>
+            </a:fld>
+            <a:endParaRPr lang="en-US"/>
+          </a:p>
+        </p:txBody>
+      </p:sp>
+    </p:spTree>
+    <p:extLst>
+      <p:ext uri="{BB962C8B-B14F-4D97-AF65-F5344CB8AC3E}">
+        <p14:creationId xmlns:p14="http://schemas.microsoft.com/office/powerpoint/2010/main" val="3949244575"/>
+      </p:ext>
+    </p:extLst>
+  </p:cSld>
+  <p:clrMapOvr>
+    <a:masterClrMapping/>
+  </p:clrMapOvr>
+</p:notes>
+</file>
+
+<file path=ppt/notesSlides/notesSlide4.xml><?xml version="1.0" encoding="utf-8"?>
+<p:notes xmlns:a="http://schemas.openxmlformats.org/drawingml/2006/main" xmlns:r="http://schemas.openxmlformats.org/officeDocument/2006/relationships" xmlns:p="http://schemas.openxmlformats.org/presentationml/2006/main">
+  <p:cSld>
+    <p:spTree>
+      <p:nvGrpSpPr>
+        <p:cNvPr id="1" name=""/>
+        <p:cNvGrpSpPr/>
+        <p:nvPr/>
+      </p:nvGrpSpPr>
+      <p:grpSpPr>
+        <a:xfrm>
+          <a:off x="0" y="0"/>
+          <a:ext cx="0" cy="0"/>
+          <a:chOff x="0" y="0"/>
+          <a:chExt cx="0" cy="0"/>
+        </a:xfrm>
+      </p:grpSpPr>
+      <p:sp>
+        <p:nvSpPr>
+          <p:cNvPr id="2" name="Folienbildplatzhalter 1"/>
+          <p:cNvSpPr>
+            <a:spLocks noGrp="1" noRot="1" noChangeAspect="1"/>
+          </p:cNvSpPr>
+          <p:nvPr>
+            <p:ph type="sldImg"/>
+          </p:nvPr>
+        </p:nvSpPr>
+        <p:spPr/>
+      </p:sp>
+      <p:sp>
+        <p:nvSpPr>
+          <p:cNvPr id="3" name="Notizenplatzhalter 2"/>
+          <p:cNvSpPr>
+            <a:spLocks noGrp="1"/>
+          </p:cNvSpPr>
+          <p:nvPr>
+            <p:ph type="body" idx="1"/>
+          </p:nvPr>
+        </p:nvSpPr>
+        <p:spPr/>
+        <p:txBody>
+          <a:bodyPr/>
+          <a:lstStyle/>
+          <a:p>
+            <a:endParaRPr lang="de-CH" dirty="0"/>
+          </a:p>
+        </p:txBody>
+      </p:sp>
+      <p:sp>
+        <p:nvSpPr>
+          <p:cNvPr id="4" name="Foliennummernplatzhalter 3"/>
+          <p:cNvSpPr>
+            <a:spLocks noGrp="1"/>
+          </p:cNvSpPr>
+          <p:nvPr>
+            <p:ph type="sldNum" sz="quarter" idx="5"/>
+          </p:nvPr>
+        </p:nvSpPr>
+        <p:spPr/>
+        <p:txBody>
+          <a:bodyPr/>
+          <a:lstStyle/>
+          <a:p>
+            <a:fld id="{FFAEC33B-D15A-F948-9B21-8F6BC0A9396E}" type="slidenum">
+              <a:rPr lang="en-US" smtClean="0"/>
+              <a:t>8</a:t>
+            </a:fld>
+            <a:endParaRPr lang="en-US"/>
+          </a:p>
+        </p:txBody>
+      </p:sp>
+    </p:spTree>
+    <p:extLst>
+      <p:ext uri="{BB962C8B-B14F-4D97-AF65-F5344CB8AC3E}">
+        <p14:creationId xmlns:p14="http://schemas.microsoft.com/office/powerpoint/2010/main" val="954470227"/>
+      </p:ext>
+    </p:extLst>
+  </p:cSld>
+  <p:clrMapOvr>
+    <a:masterClrMapping/>
+  </p:clrMapOvr>
+</p:notes>
+</file>
+
 <file path=ppt/slideLayouts/slideLayout1.xml><?xml version="1.0" encoding="utf-8"?>
 <p:sldLayout xmlns:a="http://schemas.openxmlformats.org/drawingml/2006/main" xmlns:r="http://schemas.openxmlformats.org/officeDocument/2006/relationships" xmlns:p="http://schemas.openxmlformats.org/presentationml/2006/main" type="title" preserve="1">
   <p:cSld name="Title Slide">
@@ -12978,7 +13538,7 @@
           <a:p>
             <a:fld id="{85634D96-BAC6-624E-89B2-93829D52EF74}" type="datetimeFigureOut">
               <a:rPr lang="de-DE" smtClean="0"/>
-              <a:t>29.04.19</a:t>
+              <a:t>01.05.2019</a:t>
             </a:fld>
             <a:endParaRPr lang="de-DE"/>
           </a:p>
@@ -13048,7 +13608,7 @@
           <a:p>
             <a:fld id="{3A79EDE4-AB98-A64A-BFD5-DA8FF91B9E2C}" type="slidenum">
               <a:rPr lang="de-DE" smtClean="0"/>
-              <a:t>‹#›</a:t>
+              <a:t>‹Nr.›</a:t>
             </a:fld>
             <a:endParaRPr lang="de-DE"/>
           </a:p>
@@ -13202,7 +13762,7 @@
           <a:p>
             <a:fld id="{85634D96-BAC6-624E-89B2-93829D52EF74}" type="datetimeFigureOut">
               <a:rPr lang="de-DE" smtClean="0"/>
-              <a:t>29.04.19</a:t>
+              <a:t>01.05.2019</a:t>
             </a:fld>
             <a:endParaRPr lang="de-DE"/>
           </a:p>
@@ -13272,7 +13832,7 @@
           <a:p>
             <a:fld id="{3A79EDE4-AB98-A64A-BFD5-DA8FF91B9E2C}" type="slidenum">
               <a:rPr lang="de-DE" smtClean="0"/>
-              <a:t>‹#›</a:t>
+              <a:t>‹Nr.›</a:t>
             </a:fld>
             <a:endParaRPr lang="de-DE"/>
           </a:p>
@@ -13436,7 +13996,7 @@
           <a:p>
             <a:fld id="{85634D96-BAC6-624E-89B2-93829D52EF74}" type="datetimeFigureOut">
               <a:rPr lang="de-DE" smtClean="0"/>
-              <a:t>29.04.19</a:t>
+              <a:t>01.05.2019</a:t>
             </a:fld>
             <a:endParaRPr lang="de-DE"/>
           </a:p>
@@ -13506,7 +14066,7 @@
           <a:p>
             <a:fld id="{3A79EDE4-AB98-A64A-BFD5-DA8FF91B9E2C}" type="slidenum">
               <a:rPr lang="de-DE" smtClean="0"/>
-              <a:t>‹#›</a:t>
+              <a:t>‹Nr.›</a:t>
             </a:fld>
             <a:endParaRPr lang="de-DE"/>
           </a:p>
@@ -13660,7 +14220,7 @@
           <a:p>
             <a:fld id="{85634D96-BAC6-624E-89B2-93829D52EF74}" type="datetimeFigureOut">
               <a:rPr lang="de-DE" smtClean="0"/>
-              <a:t>29.04.19</a:t>
+              <a:t>01.05.2019</a:t>
             </a:fld>
             <a:endParaRPr lang="de-DE"/>
           </a:p>
@@ -13730,7 +14290,7 @@
           <a:p>
             <a:fld id="{3A79EDE4-AB98-A64A-BFD5-DA8FF91B9E2C}" type="slidenum">
               <a:rPr lang="de-DE" smtClean="0"/>
-              <a:t>‹#›</a:t>
+              <a:t>‹Nr.›</a:t>
             </a:fld>
             <a:endParaRPr lang="de-DE"/>
           </a:p>
@@ -13960,7 +14520,7 @@
           <a:p>
             <a:fld id="{85634D96-BAC6-624E-89B2-93829D52EF74}" type="datetimeFigureOut">
               <a:rPr lang="de-DE" smtClean="0"/>
-              <a:t>29.04.19</a:t>
+              <a:t>01.05.2019</a:t>
             </a:fld>
             <a:endParaRPr lang="de-DE"/>
           </a:p>
@@ -14030,7 +14590,7 @@
           <a:p>
             <a:fld id="{3A79EDE4-AB98-A64A-BFD5-DA8FF91B9E2C}" type="slidenum">
               <a:rPr lang="de-DE" smtClean="0"/>
-              <a:t>‹#›</a:t>
+              <a:t>‹Nr.›</a:t>
             </a:fld>
             <a:endParaRPr lang="de-DE"/>
           </a:p>
@@ -14252,7 +14812,7 @@
           <a:p>
             <a:fld id="{85634D96-BAC6-624E-89B2-93829D52EF74}" type="datetimeFigureOut">
               <a:rPr lang="de-DE" smtClean="0"/>
-              <a:t>29.04.19</a:t>
+              <a:t>01.05.2019</a:t>
             </a:fld>
             <a:endParaRPr lang="de-DE"/>
           </a:p>
@@ -14322,7 +14882,7 @@
           <a:p>
             <a:fld id="{3A79EDE4-AB98-A64A-BFD5-DA8FF91B9E2C}" type="slidenum">
               <a:rPr lang="de-DE" smtClean="0"/>
-              <a:t>‹#›</a:t>
+              <a:t>‹Nr.›</a:t>
             </a:fld>
             <a:endParaRPr lang="de-DE"/>
           </a:p>
@@ -14691,7 +15251,7 @@
           <a:p>
             <a:fld id="{85634D96-BAC6-624E-89B2-93829D52EF74}" type="datetimeFigureOut">
               <a:rPr lang="de-DE" smtClean="0"/>
-              <a:t>29.04.19</a:t>
+              <a:t>01.05.2019</a:t>
             </a:fld>
             <a:endParaRPr lang="de-DE"/>
           </a:p>
@@ -14761,7 +15321,7 @@
           <a:p>
             <a:fld id="{3A79EDE4-AB98-A64A-BFD5-DA8FF91B9E2C}" type="slidenum">
               <a:rPr lang="de-DE" smtClean="0"/>
-              <a:t>‹#›</a:t>
+              <a:t>‹Nr.›</a:t>
             </a:fld>
             <a:endParaRPr lang="de-DE"/>
           </a:p>
@@ -14857,7 +15417,7 @@
           <a:p>
             <a:fld id="{85634D96-BAC6-624E-89B2-93829D52EF74}" type="datetimeFigureOut">
               <a:rPr lang="de-DE" smtClean="0"/>
-              <a:t>29.04.19</a:t>
+              <a:t>01.05.2019</a:t>
             </a:fld>
             <a:endParaRPr lang="de-DE"/>
           </a:p>
@@ -14927,7 +15487,7 @@
           <a:p>
             <a:fld id="{3A79EDE4-AB98-A64A-BFD5-DA8FF91B9E2C}" type="slidenum">
               <a:rPr lang="de-DE" smtClean="0"/>
-              <a:t>‹#›</a:t>
+              <a:t>‹Nr.›</a:t>
             </a:fld>
             <a:endParaRPr lang="de-DE"/>
           </a:p>
@@ -14994,7 +15554,7 @@
           <a:p>
             <a:fld id="{85634D96-BAC6-624E-89B2-93829D52EF74}" type="datetimeFigureOut">
               <a:rPr lang="de-DE" smtClean="0"/>
-              <a:t>29.04.19</a:t>
+              <a:t>01.05.2019</a:t>
             </a:fld>
             <a:endParaRPr lang="de-DE"/>
           </a:p>
@@ -15064,7 +15624,7 @@
           <a:p>
             <a:fld id="{3A79EDE4-AB98-A64A-BFD5-DA8FF91B9E2C}" type="slidenum">
               <a:rPr lang="de-DE" smtClean="0"/>
-              <a:t>‹#›</a:t>
+              <a:t>‹Nr.›</a:t>
             </a:fld>
             <a:endParaRPr lang="de-DE"/>
           </a:p>
@@ -15331,7 +15891,7 @@
           <a:p>
             <a:fld id="{85634D96-BAC6-624E-89B2-93829D52EF74}" type="datetimeFigureOut">
               <a:rPr lang="de-DE" smtClean="0"/>
-              <a:t>29.04.19</a:t>
+              <a:t>01.05.2019</a:t>
             </a:fld>
             <a:endParaRPr lang="de-DE"/>
           </a:p>
@@ -15401,7 +15961,7 @@
           <a:p>
             <a:fld id="{3A79EDE4-AB98-A64A-BFD5-DA8FF91B9E2C}" type="slidenum">
               <a:rPr lang="de-DE" smtClean="0"/>
-              <a:t>‹#›</a:t>
+              <a:t>‹Nr.›</a:t>
             </a:fld>
             <a:endParaRPr lang="de-DE"/>
           </a:p>
@@ -15644,7 +16204,7 @@
           <a:p>
             <a:fld id="{85634D96-BAC6-624E-89B2-93829D52EF74}" type="datetimeFigureOut">
               <a:rPr lang="de-DE" smtClean="0"/>
-              <a:t>29.04.19</a:t>
+              <a:t>01.05.2019</a:t>
             </a:fld>
             <a:endParaRPr lang="de-DE"/>
           </a:p>
@@ -15714,7 +16274,7 @@
           <a:p>
             <a:fld id="{3A79EDE4-AB98-A64A-BFD5-DA8FF91B9E2C}" type="slidenum">
               <a:rPr lang="de-DE" smtClean="0"/>
-              <a:t>‹#›</a:t>
+              <a:t>‹Nr.›</a:t>
             </a:fld>
             <a:endParaRPr lang="de-DE"/>
           </a:p>
@@ -15946,7 +16506,7 @@
           <a:p>
             <a:fld id="{3A79EDE4-AB98-A64A-BFD5-DA8FF91B9E2C}" type="slidenum">
               <a:rPr lang="de-DE" smtClean="0"/>
-              <a:t>‹#›</a:t>
+              <a:t>‹Nr.›</a:t>
             </a:fld>
             <a:endParaRPr lang="de-DE" dirty="0"/>
           </a:p>
@@ -20201,7 +20761,7 @@
               <a:rPr lang="en-US" sz="1400" dirty="0" err="1">
                 <a:latin typeface="Garamond" panose="02020404030301010803" pitchFamily="18" charset="0"/>
               </a:rPr>
-              <a:t>SDdomBanks</a:t>
+              <a:t>SDdomBanksdir</a:t>
             </a:r>
             <a:r>
               <a:rPr lang="en-US" sz="1400" dirty="0">
@@ -25147,7 +25707,7 @@
           <p:nvPr/>
         </p:nvPicPr>
         <p:blipFill>
-          <a:blip r:embed="rId2"/>
+          <a:blip r:embed="rId3"/>
           <a:stretch>
             <a:fillRect/>
           </a:stretch>
@@ -25180,14 +25740,16 @@
         </p:nvSpPr>
         <p:spPr/>
         <p:txBody>
-          <a:bodyPr/>
+          <a:bodyPr>
+            <a:normAutofit/>
+          </a:bodyPr>
           <a:lstStyle/>
           <a:p>
             <a:r>
               <a:rPr lang="en-US" dirty="0">
                 <a:latin typeface="Garamond" panose="02020404030301010803" pitchFamily="18" charset="0"/>
               </a:rPr>
-              <a:t>QE has become increasingly popular as a policy tool in zero interest environments</a:t>
+              <a:t>10 years of global Quantitative Easing</a:t>
             </a:r>
           </a:p>
         </p:txBody>
@@ -25362,10 +25924,10 @@
           <p:nvPr/>
         </p:nvPicPr>
         <p:blipFill>
-          <a:blip r:embed="rId3">
+          <a:blip r:embed="rId4">
             <a:extLst>
               <a:ext uri="{96DAC541-7B7A-43D3-8B79-37D633B846F1}">
-                <asvg:svgBlip xmlns:asvg="http://schemas.microsoft.com/office/drawing/2016/SVG/main" r:embed="rId4"/>
+                <asvg:svgBlip xmlns:asvg="http://schemas.microsoft.com/office/drawing/2016/SVG/main" r:embed="rId5"/>
               </a:ext>
             </a:extLst>
           </a:blip>
@@ -25398,10 +25960,10 @@
           <p:nvPr/>
         </p:nvPicPr>
         <p:blipFill>
-          <a:blip r:embed="rId3">
+          <a:blip r:embed="rId4">
             <a:extLst>
               <a:ext uri="{96DAC541-7B7A-43D3-8B79-37D633B846F1}">
-                <asvg:svgBlip xmlns:asvg="http://schemas.microsoft.com/office/drawing/2016/SVG/main" r:embed="rId4"/>
+                <asvg:svgBlip xmlns:asvg="http://schemas.microsoft.com/office/drawing/2016/SVG/main" r:embed="rId5"/>
               </a:ext>
             </a:extLst>
           </a:blip>
@@ -25434,10 +25996,10 @@
           <p:nvPr/>
         </p:nvPicPr>
         <p:blipFill>
-          <a:blip r:embed="rId5">
+          <a:blip r:embed="rId6">
             <a:extLst>
               <a:ext uri="{96DAC541-7B7A-43D3-8B79-37D633B846F1}">
-                <asvg:svgBlip xmlns:asvg="http://schemas.microsoft.com/office/drawing/2016/SVG/main" r:embed="rId6"/>
+                <asvg:svgBlip xmlns:asvg="http://schemas.microsoft.com/office/drawing/2016/SVG/main" r:embed="rId7"/>
               </a:ext>
             </a:extLst>
           </a:blip>
@@ -25470,10 +26032,10 @@
           <p:nvPr/>
         </p:nvPicPr>
         <p:blipFill>
-          <a:blip r:embed="rId7">
+          <a:blip r:embed="rId8">
             <a:extLst>
               <a:ext uri="{96DAC541-7B7A-43D3-8B79-37D633B846F1}">
-                <asvg:svgBlip xmlns:asvg="http://schemas.microsoft.com/office/drawing/2016/SVG/main" r:embed="rId8"/>
+                <asvg:svgBlip xmlns:asvg="http://schemas.microsoft.com/office/drawing/2016/SVG/main" r:embed="rId9"/>
               </a:ext>
             </a:extLst>
           </a:blip>
@@ -25553,7 +26115,7 @@
           <p:nvPr/>
         </p:nvPicPr>
         <p:blipFill>
-          <a:blip r:embed="rId9">
+          <a:blip r:embed="rId10">
             <a:extLst>
               <a:ext uri="{28A0092B-C50C-407E-A947-70E740481C1C}">
                 <a14:useLocalDpi xmlns:a14="http://schemas.microsoft.com/office/drawing/2010/main" val="0"/>
@@ -25600,7 +26162,7 @@
           <p:nvPr/>
         </p:nvPicPr>
         <p:blipFill>
-          <a:blip r:embed="rId10">
+          <a:blip r:embed="rId11">
             <a:extLst>
               <a:ext uri="{28A0092B-C50C-407E-A947-70E740481C1C}">
                 <a14:useLocalDpi xmlns:a14="http://schemas.microsoft.com/office/drawing/2010/main" val="0"/>
@@ -25825,7 +26387,7 @@
               <a:rPr lang="en-US" sz="1600" dirty="0">
                 <a:latin typeface="Garamond" panose="02020404030301010803" pitchFamily="18" charset="0"/>
               </a:rPr>
-              <a:t>Financial crisis in 2010 in Europe.</a:t>
+              <a:t>Govt Debt crisis in 2010 in Europe.</a:t>
             </a:r>
           </a:p>
           <a:p>
@@ -25943,10 +26505,10 @@
           <p:nvPr/>
         </p:nvPicPr>
         <p:blipFill>
-          <a:blip r:embed="rId3">
+          <a:blip r:embed="rId4">
             <a:extLst>
               <a:ext uri="{96DAC541-7B7A-43D3-8B79-37D633B846F1}">
-                <asvg:svgBlip xmlns:asvg="http://schemas.microsoft.com/office/drawing/2016/SVG/main" r:embed="rId4"/>
+                <asvg:svgBlip xmlns:asvg="http://schemas.microsoft.com/office/drawing/2016/SVG/main" r:embed="rId5"/>
               </a:ext>
             </a:extLst>
           </a:blip>
@@ -26019,7 +26581,7 @@
           <p:nvPr/>
         </p:nvPicPr>
         <p:blipFill>
-          <a:blip r:embed="rId11">
+          <a:blip r:embed="rId12">
             <a:extLst>
               <a:ext uri="{28A0092B-C50C-407E-A947-70E740481C1C}">
                 <a14:useLocalDpi xmlns:a14="http://schemas.microsoft.com/office/drawing/2010/main" val="0"/>
@@ -26066,7 +26628,7 @@
         <p:spPr>
           <a:xfrm>
             <a:off x="8821166" y="2724455"/>
-            <a:ext cx="2178807" cy="646331"/>
+            <a:ext cx="2586952" cy="369332"/>
           </a:xfrm>
           <a:prstGeom prst="rect">
             <a:avLst/>
@@ -26103,7 +26665,7 @@
         <p:spPr>
           <a:xfrm>
             <a:off x="8345911" y="3064813"/>
-            <a:ext cx="3007486" cy="2800767"/>
+            <a:ext cx="3007486" cy="2554545"/>
           </a:xfrm>
           <a:prstGeom prst="rect">
             <a:avLst/>
@@ -26124,7 +26686,7 @@
               <a:rPr lang="en-US" sz="1600" dirty="0">
                 <a:latin typeface="Garamond" panose="02020404030301010803" pitchFamily="18" charset="0"/>
               </a:rPr>
-              <a:t>European financial crisis led to strong appreciation of the CHF compared to EURO.</a:t>
+              <a:t>Strong appreciation of the CHF compared to EURO.</a:t>
             </a:r>
           </a:p>
           <a:p>
@@ -26166,7 +26728,7 @@
               <a:rPr lang="en-US" sz="1600" dirty="0">
                 <a:latin typeface="Garamond" panose="02020404030301010803" pitchFamily="18" charset="0"/>
               </a:rPr>
-              <a:t>SNB stepped in and created CHF liquidity by increasing sight deposits from CHF 5bn to CHF 500bn over ten years.</a:t>
+              <a:t>SNB created CHF liquidity by increasing sight deposits from CHF 5bn to almost CHF 500bn over ten years.</a:t>
             </a:r>
           </a:p>
         </p:txBody>
@@ -26352,7 +26914,7 @@
               <a:rPr lang="en-US" dirty="0">
                 <a:latin typeface="Garamond" panose="02020404030301010803" pitchFamily="18" charset="0"/>
               </a:rPr>
-              <a:t>Development of Sight Deposits, SMI and Exchange rate</a:t>
+              <a:t>Sight Deposits of Domestic Banks, SMI and Exchange rate</a:t>
             </a:r>
           </a:p>
         </p:txBody>
@@ -26935,7 +27497,7 @@
           <p:nvPr/>
         </p:nvPicPr>
         <p:blipFill>
-          <a:blip r:embed="rId2"/>
+          <a:blip r:embed="rId3"/>
           <a:stretch>
             <a:fillRect/>
           </a:stretch>
@@ -26975,7 +27537,7 @@
               <a:rPr lang="en-US" dirty="0">
                 <a:latin typeface="Garamond" panose="02020404030301010803" pitchFamily="18" charset="0"/>
               </a:rPr>
-              <a:t>Unconventional MP and spill over to other asset classes</a:t>
+              <a:t>Transmission Channels</a:t>
             </a:r>
           </a:p>
         </p:txBody>
@@ -27037,8 +27599,8 @@
         </p:nvSpPr>
         <p:spPr>
           <a:xfrm>
-            <a:off x="883170" y="2407654"/>
-            <a:ext cx="10515600" cy="3723320"/>
+            <a:off x="883170" y="2407655"/>
+            <a:ext cx="10515600" cy="2759658"/>
           </a:xfrm>
           <a:prstGeom prst="rect">
             <a:avLst/>
@@ -27183,14 +27745,11 @@
           <a:p>
             <a:pPr algn="ctr"/>
             <a:r>
-              <a:rPr lang="en-US" sz="1400" dirty="0" err="1">
+              <a:rPr lang="en-US" sz="1400" dirty="0">
                 <a:latin typeface="Garamond" panose="02020404030301010803" pitchFamily="18" charset="0"/>
               </a:rPr>
-              <a:t>Signalling</a:t>
+              <a:t>SIGNALLING</a:t>
             </a:r>
-            <a:endParaRPr lang="en-US" sz="1400" dirty="0">
-              <a:latin typeface="Garamond" panose="02020404030301010803" pitchFamily="18" charset="0"/>
-            </a:endParaRPr>
           </a:p>
         </p:txBody>
       </p:sp>
@@ -27240,7 +27799,7 @@
               <a:rPr lang="en-US" sz="1400" dirty="0">
                 <a:latin typeface="Garamond" panose="02020404030301010803" pitchFamily="18" charset="0"/>
               </a:rPr>
-              <a:t>Portfolio Rebalancing</a:t>
+              <a:t>PORTFOLIO REBALANCING</a:t>
             </a:r>
           </a:p>
         </p:txBody>
@@ -27260,7 +27819,7 @@
         <p:spPr>
           <a:xfrm>
             <a:off x="1359877" y="3274541"/>
-            <a:ext cx="4736123" cy="1815882"/>
+            <a:ext cx="5346401" cy="1877437"/>
           </a:xfrm>
           <a:prstGeom prst="rect">
             <a:avLst/>
@@ -27302,7 +27861,7 @@
               <a:rPr lang="en-US" sz="1400" dirty="0">
                 <a:latin typeface="Garamond" panose="02020404030301010803" pitchFamily="18" charset="0"/>
               </a:rPr>
-              <a:t>If the signal is considered credible, market participants change their expectations regarding future policy.</a:t>
+              <a:t>Credible signals change market participants expectations.</a:t>
             </a:r>
           </a:p>
           <a:p>
@@ -27323,13 +27882,13 @@
               <a:rPr lang="en-US" sz="1400" dirty="0">
                 <a:latin typeface="Garamond" panose="02020404030301010803" pitchFamily="18" charset="0"/>
               </a:rPr>
-              <a:t>The changed expectations lead to the </a:t>
+              <a:t>The changed expectations lead to a </a:t>
             </a:r>
             <a:r>
               <a:rPr lang="en-US" sz="1400" b="1" dirty="0">
                 <a:latin typeface="Garamond" panose="02020404030301010803" pitchFamily="18" charset="0"/>
               </a:rPr>
-              <a:t>relative change of asset prices</a:t>
+              <a:t>change of asset prices</a:t>
             </a:r>
             <a:r>
               <a:rPr lang="en-US" sz="1400" dirty="0">
@@ -27338,6 +27897,25 @@
               <a:t>.</a:t>
             </a:r>
           </a:p>
+          <a:p>
+            <a:pPr marL="285750" indent="-285750">
+              <a:buFont typeface="Wingdings" pitchFamily="2" charset="2"/>
+              <a:buChar char="§"/>
+            </a:pPr>
+            <a:endParaRPr lang="en-US" sz="1400" dirty="0">
+              <a:latin typeface="Garamond" panose="02020404030301010803" pitchFamily="18" charset="0"/>
+            </a:endParaRPr>
+          </a:p>
+          <a:p>
+            <a:endParaRPr lang="en-US" dirty="0">
+              <a:latin typeface="Garamond" panose="02020404030301010803" pitchFamily="18" charset="0"/>
+            </a:endParaRPr>
+          </a:p>
+          <a:p>
+            <a:endParaRPr lang="en-US" sz="1400" dirty="0">
+              <a:latin typeface="Garamond" panose="02020404030301010803" pitchFamily="18" charset="0"/>
+            </a:endParaRPr>
+          </a:p>
         </p:txBody>
       </p:sp>
       <p:sp>
@@ -27355,7 +27933,7 @@
         <p:spPr>
           <a:xfrm>
             <a:off x="6796217" y="3274541"/>
-            <a:ext cx="4512614" cy="2462213"/>
+            <a:ext cx="4512614" cy="1815882"/>
           </a:xfrm>
           <a:prstGeom prst="rect">
             <a:avLst/>
@@ -27377,27 +27955,6 @@
                 <a:latin typeface="Garamond" panose="02020404030301010803" pitchFamily="18" charset="0"/>
               </a:rPr>
               <a:t>The central bank buys from foreign investors and creates fiat money.</a:t>
-            </a:r>
-          </a:p>
-          <a:p>
-            <a:pPr marL="285750" indent="-285750">
-              <a:buFont typeface="Wingdings" pitchFamily="2" charset="2"/>
-              <a:buChar char="§"/>
-            </a:pPr>
-            <a:endParaRPr lang="en-US" sz="1400" dirty="0">
-              <a:latin typeface="Garamond" panose="02020404030301010803" pitchFamily="18" charset="0"/>
-            </a:endParaRPr>
-          </a:p>
-          <a:p>
-            <a:pPr marL="285750" indent="-285750">
-              <a:buFont typeface="Wingdings" pitchFamily="2" charset="2"/>
-              <a:buChar char="§"/>
-            </a:pPr>
-            <a:r>
-              <a:rPr lang="en-US" sz="1400" dirty="0">
-                <a:latin typeface="Garamond" panose="02020404030301010803" pitchFamily="18" charset="0"/>
-              </a:rPr>
-              <a:t>New liquidity rests as sight deposits on the central banks balance sheet and is allocated to domestic banks.</a:t>
             </a:r>
           </a:p>
           <a:p>
@@ -27455,9 +28012,6 @@
               </a:rPr>
               <a:t>Price of the assets is affected</a:t>
             </a:r>
-            <a:endParaRPr lang="en-US" sz="1400" b="1" dirty="0">
-              <a:latin typeface="Garamond" panose="02020404030301010803" pitchFamily="18" charset="0"/>
-            </a:endParaRPr>
           </a:p>
         </p:txBody>
       </p:sp>
@@ -27476,10 +28030,10 @@
           <p:nvPr/>
         </p:nvPicPr>
         <p:blipFill>
-          <a:blip r:embed="rId3">
+          <a:blip r:embed="rId4">
             <a:extLst>
               <a:ext uri="{96DAC541-7B7A-43D3-8B79-37D633B846F1}">
-                <asvg:svgBlip xmlns:asvg="http://schemas.microsoft.com/office/drawing/2016/SVG/main" r:embed="rId4"/>
+                <asvg:svgBlip xmlns:asvg="http://schemas.microsoft.com/office/drawing/2016/SVG/main" r:embed="rId5"/>
               </a:ext>
             </a:extLst>
           </a:blip>
@@ -27512,10 +28066,10 @@
           <p:nvPr/>
         </p:nvPicPr>
         <p:blipFill>
-          <a:blip r:embed="rId5">
+          <a:blip r:embed="rId6">
             <a:extLst>
               <a:ext uri="{96DAC541-7B7A-43D3-8B79-37D633B846F1}">
-                <asvg:svgBlip xmlns:asvg="http://schemas.microsoft.com/office/drawing/2016/SVG/main" r:embed="rId6"/>
+                <asvg:svgBlip xmlns:asvg="http://schemas.microsoft.com/office/drawing/2016/SVG/main" r:embed="rId7"/>
               </a:ext>
             </a:extLst>
           </a:blip>
@@ -27533,6 +28087,71 @@
           </a:prstGeom>
         </p:spPr>
       </p:pic>
+      <p:sp>
+        <p:nvSpPr>
+          <p:cNvPr id="6" name="Textfeld 5">
+            <a:extLst>
+              <a:ext uri="{FF2B5EF4-FFF2-40B4-BE49-F238E27FC236}">
+                <a16:creationId xmlns:a16="http://schemas.microsoft.com/office/drawing/2014/main" id="{0D9712E1-CFBD-4EA8-8DED-7B507AC2DD4F}"/>
+              </a:ext>
+            </a:extLst>
+          </p:cNvPr>
+          <p:cNvSpPr txBox="1"/>
+          <p:nvPr/>
+        </p:nvSpPr>
+        <p:spPr>
+          <a:xfrm>
+            <a:off x="1014898" y="5432545"/>
+            <a:ext cx="9641955" cy="1092607"/>
+          </a:xfrm>
+          <a:prstGeom prst="rect">
+            <a:avLst/>
+          </a:prstGeom>
+          <a:noFill/>
+        </p:spPr>
+        <p:txBody>
+          <a:bodyPr wrap="square" rtlCol="0">
+            <a:spAutoFit/>
+          </a:bodyPr>
+          <a:lstStyle/>
+          <a:p>
+            <a:pPr marL="285750" indent="-285750">
+              <a:buFont typeface="Wingdings" panose="05000000000000000000" pitchFamily="2" charset="2"/>
+              <a:buChar char="§"/>
+            </a:pPr>
+            <a:r>
+              <a:rPr lang="en-US" dirty="0">
+                <a:latin typeface="Garamond" panose="02020404030301010803" pitchFamily="18" charset="0"/>
+              </a:rPr>
+              <a:t>Information about Sight Deposit as our Signal to be priced into the Stock Market.</a:t>
+            </a:r>
+          </a:p>
+          <a:p>
+            <a:pPr marL="285750" indent="-285750">
+              <a:buFont typeface="Wingdings" panose="05000000000000000000" pitchFamily="2" charset="2"/>
+              <a:buChar char="§"/>
+            </a:pPr>
+            <a:endParaRPr lang="en-US" sz="1000" dirty="0">
+              <a:latin typeface="Garamond" panose="02020404030301010803" pitchFamily="18" charset="0"/>
+            </a:endParaRPr>
+          </a:p>
+          <a:p>
+            <a:pPr marL="285750" indent="-285750">
+              <a:buFont typeface="Wingdings" panose="05000000000000000000" pitchFamily="2" charset="2"/>
+              <a:buChar char="§"/>
+            </a:pPr>
+            <a:r>
+              <a:rPr lang="en-US" dirty="0">
+                <a:latin typeface="Garamond" panose="02020404030301010803" pitchFamily="18" charset="0"/>
+              </a:rPr>
+              <a:t>No conclusion about directions of patterns</a:t>
+            </a:r>
+          </a:p>
+          <a:p>
+            <a:endParaRPr lang="de-CH" dirty="0"/>
+          </a:p>
+        </p:txBody>
+      </p:sp>
     </p:spTree>
     <p:extLst>
       <p:ext uri="{BB962C8B-B14F-4D97-AF65-F5344CB8AC3E}">
@@ -27578,7 +28197,7 @@
           <p:nvPr/>
         </p:nvPicPr>
         <p:blipFill>
-          <a:blip r:embed="rId2"/>
+          <a:blip r:embed="rId3"/>
           <a:stretch>
             <a:fillRect/>
           </a:stretch>
@@ -27967,7 +28586,7 @@
           <p:nvPr/>
         </p:nvPicPr>
         <p:blipFill>
-          <a:blip r:embed="rId2"/>
+          <a:blip r:embed="rId3"/>
           <a:stretch>
             <a:fillRect/>
           </a:stretch>
@@ -27997,7 +28616,7 @@
           <p:nvPr/>
         </p:nvPicPr>
         <p:blipFill>
-          <a:blip r:embed="rId3"/>
+          <a:blip r:embed="rId4"/>
           <a:stretch>
             <a:fillRect/>
           </a:stretch>

</xml_diff>